<commit_message>
BH simulation modules completed, FMM halfway
</commit_message>
<xml_diff>
--- a/Misc/Nbody drawings.pptx
+++ b/Misc/Nbody drawings.pptx
@@ -36,6 +36,7 @@
     <p:sldId id="286" r:id="rId30"/>
     <p:sldId id="267" r:id="rId31"/>
     <p:sldId id="284" r:id="rId32"/>
+    <p:sldId id="290" r:id="rId33"/>
   </p:sldIdLst>
   <p:sldSz cx="12192000" cy="6858000"/>
   <p:notesSz cx="6858000" cy="9144000"/>
@@ -145,7 +146,7 @@
 <file path=ppt/revisionInfo.xml><?xml version="1.0" encoding="utf-8"?>
 <p1510:revInfo xmlns:a="http://schemas.openxmlformats.org/drawingml/2006/main" xmlns:r="http://schemas.openxmlformats.org/officeDocument/2006/relationships" xmlns:p1510="http://schemas.microsoft.com/office/powerpoint/2015/10/main">
   <p1510:revLst>
-    <p1510:client id="{D7C0658D-90F2-4913-A583-EF94A943791B}" v="113" dt="2023-06-24T16:56:36.224"/>
+    <p1510:client id="{D7C0658D-90F2-4913-A583-EF94A943791B}" v="115" dt="2023-07-24T15:16:38.101"/>
   </p1510:revLst>
 </p1510:revInfo>
 </file>
@@ -155,7 +156,7 @@
   <pc:docChgLst>
     <pc:chgData name="Tay Zhan Keith" userId="c2142f1051427aa6" providerId="LiveId" clId="{D7C0658D-90F2-4913-A583-EF94A943791B}"/>
     <pc:docChg chg="undo redo custSel addSld modSld">
-      <pc:chgData name="Tay Zhan Keith" userId="c2142f1051427aa6" providerId="LiveId" clId="{D7C0658D-90F2-4913-A583-EF94A943791B}" dt="2023-06-24T19:17:41.992" v="627" actId="14100"/>
+      <pc:chgData name="Tay Zhan Keith" userId="c2142f1051427aa6" providerId="LiveId" clId="{D7C0658D-90F2-4913-A583-EF94A943791B}" dt="2023-07-24T15:16:38.101" v="631" actId="478"/>
       <pc:docMkLst>
         <pc:docMk/>
       </pc:docMkLst>
@@ -905,6 +906,37 @@
             <ac:cxnSpMk id="134" creationId="{B0468936-F72E-09E4-FE76-6C657AAAF3D1}"/>
           </ac:cxnSpMkLst>
         </pc:cxnChg>
+      </pc:sldChg>
+      <pc:sldChg chg="addSp delSp modSp new mod">
+        <pc:chgData name="Tay Zhan Keith" userId="c2142f1051427aa6" providerId="LiveId" clId="{D7C0658D-90F2-4913-A583-EF94A943791B}" dt="2023-07-24T15:16:38.101" v="631" actId="478"/>
+        <pc:sldMkLst>
+          <pc:docMk/>
+          <pc:sldMk cId="1464739500" sldId="290"/>
+        </pc:sldMkLst>
+        <pc:spChg chg="del">
+          <ac:chgData name="Tay Zhan Keith" userId="c2142f1051427aa6" providerId="LiveId" clId="{D7C0658D-90F2-4913-A583-EF94A943791B}" dt="2023-07-24T15:16:32.498" v="629" actId="478"/>
+          <ac:spMkLst>
+            <pc:docMk/>
+            <pc:sldMk cId="1464739500" sldId="290"/>
+            <ac:spMk id="2" creationId="{C3FC662C-102E-4D71-276D-261F5909082D}"/>
+          </ac:spMkLst>
+        </pc:spChg>
+        <pc:spChg chg="del">
+          <ac:chgData name="Tay Zhan Keith" userId="c2142f1051427aa6" providerId="LiveId" clId="{D7C0658D-90F2-4913-A583-EF94A943791B}" dt="2023-07-24T15:16:32.498" v="629" actId="478"/>
+          <ac:spMkLst>
+            <pc:docMk/>
+            <pc:sldMk cId="1464739500" sldId="290"/>
+            <ac:spMk id="3" creationId="{4C4901E3-7CEF-55AD-9489-859AE9F8D4B3}"/>
+          </ac:spMkLst>
+        </pc:spChg>
+        <pc:spChg chg="add del mod">
+          <ac:chgData name="Tay Zhan Keith" userId="c2142f1051427aa6" providerId="LiveId" clId="{D7C0658D-90F2-4913-A583-EF94A943791B}" dt="2023-07-24T15:16:38.101" v="631" actId="478"/>
+          <ac:spMkLst>
+            <pc:docMk/>
+            <pc:sldMk cId="1464739500" sldId="290"/>
+            <ac:spMk id="4" creationId="{BA540D6A-B9CF-3698-6722-6137AA8AA28D}"/>
+          </ac:spMkLst>
+        </pc:spChg>
       </pc:sldChg>
     </pc:docChg>
   </pc:docChgLst>
@@ -14358,7 +14390,7 @@
           <a:p>
             <a:fld id="{90E7F101-AFD9-4336-B8E9-8175C2E38E7B}" type="datetimeFigureOut">
               <a:rPr lang="en-US" smtClean="0"/>
-              <a:t>6/24/2023</a:t>
+              <a:t>7/24/2023</a:t>
             </a:fld>
             <a:endParaRPr lang="en-US"/>
           </a:p>
@@ -14556,7 +14588,7 @@
           <a:p>
             <a:fld id="{90E7F101-AFD9-4336-B8E9-8175C2E38E7B}" type="datetimeFigureOut">
               <a:rPr lang="en-US" smtClean="0"/>
-              <a:t>6/24/2023</a:t>
+              <a:t>7/24/2023</a:t>
             </a:fld>
             <a:endParaRPr lang="en-US"/>
           </a:p>
@@ -14764,7 +14796,7 @@
           <a:p>
             <a:fld id="{90E7F101-AFD9-4336-B8E9-8175C2E38E7B}" type="datetimeFigureOut">
               <a:rPr lang="en-US" smtClean="0"/>
-              <a:t>6/24/2023</a:t>
+              <a:t>7/24/2023</a:t>
             </a:fld>
             <a:endParaRPr lang="en-US"/>
           </a:p>
@@ -14962,7 +14994,7 @@
           <a:p>
             <a:fld id="{90E7F101-AFD9-4336-B8E9-8175C2E38E7B}" type="datetimeFigureOut">
               <a:rPr lang="en-US" smtClean="0"/>
-              <a:t>6/24/2023</a:t>
+              <a:t>7/24/2023</a:t>
             </a:fld>
             <a:endParaRPr lang="en-US"/>
           </a:p>
@@ -15237,7 +15269,7 @@
           <a:p>
             <a:fld id="{90E7F101-AFD9-4336-B8E9-8175C2E38E7B}" type="datetimeFigureOut">
               <a:rPr lang="en-US" smtClean="0"/>
-              <a:t>6/24/2023</a:t>
+              <a:t>7/24/2023</a:t>
             </a:fld>
             <a:endParaRPr lang="en-US"/>
           </a:p>
@@ -15502,7 +15534,7 @@
           <a:p>
             <a:fld id="{90E7F101-AFD9-4336-B8E9-8175C2E38E7B}" type="datetimeFigureOut">
               <a:rPr lang="en-US" smtClean="0"/>
-              <a:t>6/24/2023</a:t>
+              <a:t>7/24/2023</a:t>
             </a:fld>
             <a:endParaRPr lang="en-US"/>
           </a:p>
@@ -15914,7 +15946,7 @@
           <a:p>
             <a:fld id="{90E7F101-AFD9-4336-B8E9-8175C2E38E7B}" type="datetimeFigureOut">
               <a:rPr lang="en-US" smtClean="0"/>
-              <a:t>6/24/2023</a:t>
+              <a:t>7/24/2023</a:t>
             </a:fld>
             <a:endParaRPr lang="en-US"/>
           </a:p>
@@ -16055,7 +16087,7 @@
           <a:p>
             <a:fld id="{90E7F101-AFD9-4336-B8E9-8175C2E38E7B}" type="datetimeFigureOut">
               <a:rPr lang="en-US" smtClean="0"/>
-              <a:t>6/24/2023</a:t>
+              <a:t>7/24/2023</a:t>
             </a:fld>
             <a:endParaRPr lang="en-US"/>
           </a:p>
@@ -16168,7 +16200,7 @@
           <a:p>
             <a:fld id="{90E7F101-AFD9-4336-B8E9-8175C2E38E7B}" type="datetimeFigureOut">
               <a:rPr lang="en-US" smtClean="0"/>
-              <a:t>6/24/2023</a:t>
+              <a:t>7/24/2023</a:t>
             </a:fld>
             <a:endParaRPr lang="en-US"/>
           </a:p>
@@ -16479,7 +16511,7 @@
           <a:p>
             <a:fld id="{90E7F101-AFD9-4336-B8E9-8175C2E38E7B}" type="datetimeFigureOut">
               <a:rPr lang="en-US" smtClean="0"/>
-              <a:t>6/24/2023</a:t>
+              <a:t>7/24/2023</a:t>
             </a:fld>
             <a:endParaRPr lang="en-US"/>
           </a:p>
@@ -16767,7 +16799,7 @@
           <a:p>
             <a:fld id="{90E7F101-AFD9-4336-B8E9-8175C2E38E7B}" type="datetimeFigureOut">
               <a:rPr lang="en-US" smtClean="0"/>
-              <a:t>6/24/2023</a:t>
+              <a:t>7/24/2023</a:t>
             </a:fld>
             <a:endParaRPr lang="en-US"/>
           </a:p>
@@ -17008,7 +17040,7 @@
           <a:p>
             <a:fld id="{90E7F101-AFD9-4336-B8E9-8175C2E38E7B}" type="datetimeFigureOut">
               <a:rPr lang="en-US" smtClean="0"/>
-              <a:t>6/24/2023</a:t>
+              <a:t>7/24/2023</a:t>
             </a:fld>
             <a:endParaRPr lang="en-US"/>
           </a:p>
@@ -45500,6 +45532,36 @@
 </p:sld>
 </file>
 
+<file path=ppt/slides/slide32.xml><?xml version="1.0" encoding="utf-8"?>
+<p:sld xmlns:a="http://schemas.openxmlformats.org/drawingml/2006/main" xmlns:r="http://schemas.openxmlformats.org/officeDocument/2006/relationships" xmlns:p="http://schemas.openxmlformats.org/presentationml/2006/main">
+  <p:cSld>
+    <p:spTree>
+      <p:nvGrpSpPr>
+        <p:cNvPr id="1" name=""/>
+        <p:cNvGrpSpPr/>
+        <p:nvPr/>
+      </p:nvGrpSpPr>
+      <p:grpSpPr>
+        <a:xfrm>
+          <a:off x="0" y="0"/>
+          <a:ext cx="0" cy="0"/>
+          <a:chOff x="0" y="0"/>
+          <a:chExt cx="0" cy="0"/>
+        </a:xfrm>
+      </p:grpSpPr>
+    </p:spTree>
+    <p:extLst>
+      <p:ext uri="{BB962C8B-B14F-4D97-AF65-F5344CB8AC3E}">
+        <p14:creationId xmlns:p14="http://schemas.microsoft.com/office/powerpoint/2010/main" val="1464739500"/>
+      </p:ext>
+    </p:extLst>
+  </p:cSld>
+  <p:clrMapOvr>
+    <a:masterClrMapping/>
+  </p:clrMapOvr>
+</p:sld>
+</file>
+
 <file path=ppt/slides/slide4.xml><?xml version="1.0" encoding="utf-8"?>
 <p:sld xmlns:a="http://schemas.openxmlformats.org/drawingml/2006/main" xmlns:r="http://schemas.openxmlformats.org/officeDocument/2006/relationships" xmlns:p="http://schemas.openxmlformats.org/presentationml/2006/main">
   <p:cSld>

</xml_diff>